<commit_message>
add new box for particle distance analysis
</commit_message>
<xml_diff>
--- a/workflow_diagram.pptx
+++ b/workflow_diagram.pptx
@@ -104,6 +104,11 @@
       </a:defRPr>
     </a:lvl9pPr>
   </p:defaultTextStyle>
+  <p:extLst>
+    <p:ext uri="{EFAFB233-063F-42B5-8137-9DF3F51BA10A}">
+      <p15:sldGuideLst xmlns:p15="http://schemas.microsoft.com/office/powerpoint/2012/main"/>
+    </p:ext>
+  </p:extLst>
 </p:presentation>
 </file>
 
@@ -238,7 +243,7 @@
           <a:p>
             <a:fld id="{9A1075E0-CB55-4255-BE86-EC839F0DC694}" type="datetimeFigureOut">
               <a:rPr lang="en-CA" smtClean="0"/>
-              <a:t>2021-08-05</a:t>
+              <a:t>2021-08-24</a:t>
             </a:fld>
             <a:endParaRPr lang="en-CA"/>
           </a:p>
@@ -408,7 +413,7 @@
           <a:p>
             <a:fld id="{9A1075E0-CB55-4255-BE86-EC839F0DC694}" type="datetimeFigureOut">
               <a:rPr lang="en-CA" smtClean="0"/>
-              <a:t>2021-08-05</a:t>
+              <a:t>2021-08-24</a:t>
             </a:fld>
             <a:endParaRPr lang="en-CA"/>
           </a:p>
@@ -588,7 +593,7 @@
           <a:p>
             <a:fld id="{9A1075E0-CB55-4255-BE86-EC839F0DC694}" type="datetimeFigureOut">
               <a:rPr lang="en-CA" smtClean="0"/>
-              <a:t>2021-08-05</a:t>
+              <a:t>2021-08-24</a:t>
             </a:fld>
             <a:endParaRPr lang="en-CA"/>
           </a:p>
@@ -758,7 +763,7 @@
           <a:p>
             <a:fld id="{9A1075E0-CB55-4255-BE86-EC839F0DC694}" type="datetimeFigureOut">
               <a:rPr lang="en-CA" smtClean="0"/>
-              <a:t>2021-08-05</a:t>
+              <a:t>2021-08-24</a:t>
             </a:fld>
             <a:endParaRPr lang="en-CA"/>
           </a:p>
@@ -1004,7 +1009,7 @@
           <a:p>
             <a:fld id="{9A1075E0-CB55-4255-BE86-EC839F0DC694}" type="datetimeFigureOut">
               <a:rPr lang="en-CA" smtClean="0"/>
-              <a:t>2021-08-05</a:t>
+              <a:t>2021-08-24</a:t>
             </a:fld>
             <a:endParaRPr lang="en-CA"/>
           </a:p>
@@ -1236,7 +1241,7 @@
           <a:p>
             <a:fld id="{9A1075E0-CB55-4255-BE86-EC839F0DC694}" type="datetimeFigureOut">
               <a:rPr lang="en-CA" smtClean="0"/>
-              <a:t>2021-08-05</a:t>
+              <a:t>2021-08-24</a:t>
             </a:fld>
             <a:endParaRPr lang="en-CA"/>
           </a:p>
@@ -1603,7 +1608,7 @@
           <a:p>
             <a:fld id="{9A1075E0-CB55-4255-BE86-EC839F0DC694}" type="datetimeFigureOut">
               <a:rPr lang="en-CA" smtClean="0"/>
-              <a:t>2021-08-05</a:t>
+              <a:t>2021-08-24</a:t>
             </a:fld>
             <a:endParaRPr lang="en-CA"/>
           </a:p>
@@ -1721,7 +1726,7 @@
           <a:p>
             <a:fld id="{9A1075E0-CB55-4255-BE86-EC839F0DC694}" type="datetimeFigureOut">
               <a:rPr lang="en-CA" smtClean="0"/>
-              <a:t>2021-08-05</a:t>
+              <a:t>2021-08-24</a:t>
             </a:fld>
             <a:endParaRPr lang="en-CA"/>
           </a:p>
@@ -1816,7 +1821,7 @@
           <a:p>
             <a:fld id="{9A1075E0-CB55-4255-BE86-EC839F0DC694}" type="datetimeFigureOut">
               <a:rPr lang="en-CA" smtClean="0"/>
-              <a:t>2021-08-05</a:t>
+              <a:t>2021-08-24</a:t>
             </a:fld>
             <a:endParaRPr lang="en-CA"/>
           </a:p>
@@ -2093,7 +2098,7 @@
           <a:p>
             <a:fld id="{9A1075E0-CB55-4255-BE86-EC839F0DC694}" type="datetimeFigureOut">
               <a:rPr lang="en-CA" smtClean="0"/>
-              <a:t>2021-08-05</a:t>
+              <a:t>2021-08-24</a:t>
             </a:fld>
             <a:endParaRPr lang="en-CA"/>
           </a:p>
@@ -2350,7 +2355,7 @@
           <a:p>
             <a:fld id="{9A1075E0-CB55-4255-BE86-EC839F0DC694}" type="datetimeFigureOut">
               <a:rPr lang="en-CA" smtClean="0"/>
-              <a:t>2021-08-05</a:t>
+              <a:t>2021-08-24</a:t>
             </a:fld>
             <a:endParaRPr lang="en-CA"/>
           </a:p>
@@ -2563,7 +2568,7 @@
           <a:p>
             <a:fld id="{9A1075E0-CB55-4255-BE86-EC839F0DC694}" type="datetimeFigureOut">
               <a:rPr lang="en-CA" smtClean="0"/>
-              <a:t>2021-08-05</a:t>
+              <a:t>2021-08-24</a:t>
             </a:fld>
             <a:endParaRPr lang="en-CA"/>
           </a:p>
@@ -4870,6 +4875,123 @@
           </a:p>
         </p:txBody>
       </p:sp>
+      <p:sp>
+        <p:nvSpPr>
+          <p:cNvPr id="25" name="TextBox 24">
+            <a:extLst>
+              <a:ext uri="{FF2B5EF4-FFF2-40B4-BE49-F238E27FC236}">
+                <a16:creationId xmlns:a16="http://schemas.microsoft.com/office/drawing/2014/main" id="{B09025C9-5799-43B5-A4FC-438D158B4789}"/>
+              </a:ext>
+            </a:extLst>
+          </p:cNvPr>
+          <p:cNvSpPr txBox="1"/>
+          <p:nvPr/>
+        </p:nvSpPr>
+        <p:spPr>
+          <a:xfrm>
+            <a:off x="21907645" y="11961219"/>
+            <a:ext cx="4910139" cy="4524315"/>
+          </a:xfrm>
+          <a:prstGeom prst="rect">
+            <a:avLst/>
+          </a:prstGeom>
+        </p:spPr>
+        <p:style>
+          <a:lnRef idx="2">
+            <a:schemeClr val="accent4"/>
+          </a:lnRef>
+          <a:fillRef idx="1">
+            <a:schemeClr val="lt1"/>
+          </a:fillRef>
+          <a:effectRef idx="0">
+            <a:schemeClr val="accent4"/>
+          </a:effectRef>
+          <a:fontRef idx="minor">
+            <a:schemeClr val="dk1"/>
+          </a:fontRef>
+        </p:style>
+        <p:txBody>
+          <a:bodyPr wrap="square" rtlCol="0">
+            <a:spAutoFit/>
+          </a:bodyPr>
+          <a:lstStyle/>
+          <a:p>
+            <a:r>
+              <a:rPr lang="en-CA" b="1" dirty="0"/>
+              <a:t>Distance/recruitment vs. PLD -  GLM</a:t>
+            </a:r>
+          </a:p>
+          <a:p>
+            <a:endParaRPr lang="en-CA" b="1" dirty="0"/>
+          </a:p>
+          <a:p>
+            <a:r>
+              <a:rPr lang="en-CA" b="1" dirty="0"/>
+              <a:t>Particle distance:</a:t>
+            </a:r>
+            <a:endParaRPr lang="en-CA" dirty="0"/>
+          </a:p>
+          <a:p>
+            <a:r>
+              <a:rPr lang="en-CA" dirty="0"/>
+              <a:t>scripts/</a:t>
+            </a:r>
+            <a:r>
+              <a:rPr lang="en-CA" dirty="0" err="1"/>
+              <a:t>distance_analysis_particles</a:t>
+            </a:r>
+            <a:endParaRPr lang="en-CA" dirty="0"/>
+          </a:p>
+          <a:p>
+            <a:r>
+              <a:rPr lang="en-CA" dirty="0"/>
+              <a:t>Calculate the least cost path distance traveled by all particles</a:t>
+            </a:r>
+          </a:p>
+          <a:p>
+            <a:endParaRPr lang="en-CA" dirty="0"/>
+          </a:p>
+          <a:p>
+            <a:r>
+              <a:rPr lang="en-CA" b="1" dirty="0"/>
+              <a:t>Fetch:</a:t>
+            </a:r>
+          </a:p>
+          <a:p>
+            <a:r>
+              <a:rPr lang="en-CA" dirty="0"/>
+              <a:t>scripts/fetch</a:t>
+            </a:r>
+          </a:p>
+          <a:p>
+            <a:endParaRPr lang="en-CA" dirty="0"/>
+          </a:p>
+          <a:p>
+            <a:r>
+              <a:rPr lang="en-CA" b="1" dirty="0"/>
+              <a:t>Wrangle massive data frame:</a:t>
+            </a:r>
+          </a:p>
+          <a:p>
+            <a:endParaRPr lang="en-CA" dirty="0"/>
+          </a:p>
+          <a:p>
+            <a:endParaRPr lang="en-CA" dirty="0"/>
+          </a:p>
+          <a:p>
+            <a:r>
+              <a:rPr lang="en-CA" b="1" dirty="0"/>
+              <a:t>Model:</a:t>
+            </a:r>
+          </a:p>
+          <a:p>
+            <a:endParaRPr lang="en-CA" b="1" dirty="0"/>
+          </a:p>
+          <a:p>
+            <a:endParaRPr lang="en-CA" b="1" dirty="0"/>
+          </a:p>
+        </p:txBody>
+      </p:sp>
     </p:spTree>
     <p:extLst>
       <p:ext uri="{BB962C8B-B14F-4D97-AF65-F5344CB8AC3E}">

</xml_diff>

<commit_message>
add df wrangle folder
</commit_message>
<xml_diff>
--- a/workflow_diagram.pptx
+++ b/workflow_diagram.pptx
@@ -243,7 +243,7 @@
           <a:p>
             <a:fld id="{9A1075E0-CB55-4255-BE86-EC839F0DC694}" type="datetimeFigureOut">
               <a:rPr lang="en-CA" smtClean="0"/>
-              <a:t>2021-09-05</a:t>
+              <a:t>2021-09-08</a:t>
             </a:fld>
             <a:endParaRPr lang="en-CA"/>
           </a:p>
@@ -413,7 +413,7 @@
           <a:p>
             <a:fld id="{9A1075E0-CB55-4255-BE86-EC839F0DC694}" type="datetimeFigureOut">
               <a:rPr lang="en-CA" smtClean="0"/>
-              <a:t>2021-09-05</a:t>
+              <a:t>2021-09-08</a:t>
             </a:fld>
             <a:endParaRPr lang="en-CA"/>
           </a:p>
@@ -593,7 +593,7 @@
           <a:p>
             <a:fld id="{9A1075E0-CB55-4255-BE86-EC839F0DC694}" type="datetimeFigureOut">
               <a:rPr lang="en-CA" smtClean="0"/>
-              <a:t>2021-09-05</a:t>
+              <a:t>2021-09-08</a:t>
             </a:fld>
             <a:endParaRPr lang="en-CA"/>
           </a:p>
@@ -763,7 +763,7 @@
           <a:p>
             <a:fld id="{9A1075E0-CB55-4255-BE86-EC839F0DC694}" type="datetimeFigureOut">
               <a:rPr lang="en-CA" smtClean="0"/>
-              <a:t>2021-09-05</a:t>
+              <a:t>2021-09-08</a:t>
             </a:fld>
             <a:endParaRPr lang="en-CA"/>
           </a:p>
@@ -1009,7 +1009,7 @@
           <a:p>
             <a:fld id="{9A1075E0-CB55-4255-BE86-EC839F0DC694}" type="datetimeFigureOut">
               <a:rPr lang="en-CA" smtClean="0"/>
-              <a:t>2021-09-05</a:t>
+              <a:t>2021-09-08</a:t>
             </a:fld>
             <a:endParaRPr lang="en-CA"/>
           </a:p>
@@ -1241,7 +1241,7 @@
           <a:p>
             <a:fld id="{9A1075E0-CB55-4255-BE86-EC839F0DC694}" type="datetimeFigureOut">
               <a:rPr lang="en-CA" smtClean="0"/>
-              <a:t>2021-09-05</a:t>
+              <a:t>2021-09-08</a:t>
             </a:fld>
             <a:endParaRPr lang="en-CA"/>
           </a:p>
@@ -1608,7 +1608,7 @@
           <a:p>
             <a:fld id="{9A1075E0-CB55-4255-BE86-EC839F0DC694}" type="datetimeFigureOut">
               <a:rPr lang="en-CA" smtClean="0"/>
-              <a:t>2021-09-05</a:t>
+              <a:t>2021-09-08</a:t>
             </a:fld>
             <a:endParaRPr lang="en-CA"/>
           </a:p>
@@ -1726,7 +1726,7 @@
           <a:p>
             <a:fld id="{9A1075E0-CB55-4255-BE86-EC839F0DC694}" type="datetimeFigureOut">
               <a:rPr lang="en-CA" smtClean="0"/>
-              <a:t>2021-09-05</a:t>
+              <a:t>2021-09-08</a:t>
             </a:fld>
             <a:endParaRPr lang="en-CA"/>
           </a:p>
@@ -1821,7 +1821,7 @@
           <a:p>
             <a:fld id="{9A1075E0-CB55-4255-BE86-EC839F0DC694}" type="datetimeFigureOut">
               <a:rPr lang="en-CA" smtClean="0"/>
-              <a:t>2021-09-05</a:t>
+              <a:t>2021-09-08</a:t>
             </a:fld>
             <a:endParaRPr lang="en-CA"/>
           </a:p>
@@ -2098,7 +2098,7 @@
           <a:p>
             <a:fld id="{9A1075E0-CB55-4255-BE86-EC839F0DC694}" type="datetimeFigureOut">
               <a:rPr lang="en-CA" smtClean="0"/>
-              <a:t>2021-09-05</a:t>
+              <a:t>2021-09-08</a:t>
             </a:fld>
             <a:endParaRPr lang="en-CA"/>
           </a:p>
@@ -2355,7 +2355,7 @@
           <a:p>
             <a:fld id="{9A1075E0-CB55-4255-BE86-EC839F0DC694}" type="datetimeFigureOut">
               <a:rPr lang="en-CA" smtClean="0"/>
-              <a:t>2021-09-05</a:t>
+              <a:t>2021-09-08</a:t>
             </a:fld>
             <a:endParaRPr lang="en-CA"/>
           </a:p>
@@ -2568,7 +2568,7 @@
           <a:p>
             <a:fld id="{9A1075E0-CB55-4255-BE86-EC839F0DC694}" type="datetimeFigureOut">
               <a:rPr lang="en-CA" smtClean="0"/>
-              <a:t>2021-09-05</a:t>
+              <a:t>2021-09-08</a:t>
             </a:fld>
             <a:endParaRPr lang="en-CA"/>
           </a:p>
@@ -4979,6 +4979,14 @@
             </a:r>
           </a:p>
           <a:p>
+            <a:r>
+              <a:rPr lang="en-CA" dirty="0"/>
+              <a:t>scripts/</a:t>
+            </a:r>
+            <a:r>
+              <a:rPr lang="en-CA" dirty="0" err="1"/>
+              <a:t>particles_df</a:t>
+            </a:r>
             <a:endParaRPr lang="en-CA" dirty="0"/>
           </a:p>
           <a:p>

</xml_diff>

<commit_message>
clean up figure list
</commit_message>
<xml_diff>
--- a/workflow_diagram.pptx
+++ b/workflow_diagram.pptx
@@ -243,7 +243,7 @@
           <a:p>
             <a:fld id="{9A1075E0-CB55-4255-BE86-EC839F0DC694}" type="datetimeFigureOut">
               <a:rPr lang="en-CA" smtClean="0"/>
-              <a:t>2021-11-10</a:t>
+              <a:t>2022-03-07</a:t>
             </a:fld>
             <a:endParaRPr lang="en-CA"/>
           </a:p>
@@ -413,7 +413,7 @@
           <a:p>
             <a:fld id="{9A1075E0-CB55-4255-BE86-EC839F0DC694}" type="datetimeFigureOut">
               <a:rPr lang="en-CA" smtClean="0"/>
-              <a:t>2021-11-10</a:t>
+              <a:t>2022-03-07</a:t>
             </a:fld>
             <a:endParaRPr lang="en-CA"/>
           </a:p>
@@ -593,7 +593,7 @@
           <a:p>
             <a:fld id="{9A1075E0-CB55-4255-BE86-EC839F0DC694}" type="datetimeFigureOut">
               <a:rPr lang="en-CA" smtClean="0"/>
-              <a:t>2021-11-10</a:t>
+              <a:t>2022-03-07</a:t>
             </a:fld>
             <a:endParaRPr lang="en-CA"/>
           </a:p>
@@ -763,7 +763,7 @@
           <a:p>
             <a:fld id="{9A1075E0-CB55-4255-BE86-EC839F0DC694}" type="datetimeFigureOut">
               <a:rPr lang="en-CA" smtClean="0"/>
-              <a:t>2021-11-10</a:t>
+              <a:t>2022-03-07</a:t>
             </a:fld>
             <a:endParaRPr lang="en-CA"/>
           </a:p>
@@ -1009,7 +1009,7 @@
           <a:p>
             <a:fld id="{9A1075E0-CB55-4255-BE86-EC839F0DC694}" type="datetimeFigureOut">
               <a:rPr lang="en-CA" smtClean="0"/>
-              <a:t>2021-11-10</a:t>
+              <a:t>2022-03-07</a:t>
             </a:fld>
             <a:endParaRPr lang="en-CA"/>
           </a:p>
@@ -1241,7 +1241,7 @@
           <a:p>
             <a:fld id="{9A1075E0-CB55-4255-BE86-EC839F0DC694}" type="datetimeFigureOut">
               <a:rPr lang="en-CA" smtClean="0"/>
-              <a:t>2021-11-10</a:t>
+              <a:t>2022-03-07</a:t>
             </a:fld>
             <a:endParaRPr lang="en-CA"/>
           </a:p>
@@ -1608,7 +1608,7 @@
           <a:p>
             <a:fld id="{9A1075E0-CB55-4255-BE86-EC839F0DC694}" type="datetimeFigureOut">
               <a:rPr lang="en-CA" smtClean="0"/>
-              <a:t>2021-11-10</a:t>
+              <a:t>2022-03-07</a:t>
             </a:fld>
             <a:endParaRPr lang="en-CA"/>
           </a:p>
@@ -1726,7 +1726,7 @@
           <a:p>
             <a:fld id="{9A1075E0-CB55-4255-BE86-EC839F0DC694}" type="datetimeFigureOut">
               <a:rPr lang="en-CA" smtClean="0"/>
-              <a:t>2021-11-10</a:t>
+              <a:t>2022-03-07</a:t>
             </a:fld>
             <a:endParaRPr lang="en-CA"/>
           </a:p>
@@ -1821,7 +1821,7 @@
           <a:p>
             <a:fld id="{9A1075E0-CB55-4255-BE86-EC839F0DC694}" type="datetimeFigureOut">
               <a:rPr lang="en-CA" smtClean="0"/>
-              <a:t>2021-11-10</a:t>
+              <a:t>2022-03-07</a:t>
             </a:fld>
             <a:endParaRPr lang="en-CA"/>
           </a:p>
@@ -2098,7 +2098,7 @@
           <a:p>
             <a:fld id="{9A1075E0-CB55-4255-BE86-EC839F0DC694}" type="datetimeFigureOut">
               <a:rPr lang="en-CA" smtClean="0"/>
-              <a:t>2021-11-10</a:t>
+              <a:t>2022-03-07</a:t>
             </a:fld>
             <a:endParaRPr lang="en-CA"/>
           </a:p>
@@ -2355,7 +2355,7 @@
           <a:p>
             <a:fld id="{9A1075E0-CB55-4255-BE86-EC839F0DC694}" type="datetimeFigureOut">
               <a:rPr lang="en-CA" smtClean="0"/>
-              <a:t>2021-11-10</a:t>
+              <a:t>2022-03-07</a:t>
             </a:fld>
             <a:endParaRPr lang="en-CA"/>
           </a:p>
@@ -2568,7 +2568,7 @@
           <a:p>
             <a:fld id="{9A1075E0-CB55-4255-BE86-EC839F0DC694}" type="datetimeFigureOut">
               <a:rPr lang="en-CA" smtClean="0"/>
-              <a:t>2021-11-10</a:t>
+              <a:t>2022-03-07</a:t>
             </a:fld>
             <a:endParaRPr lang="en-CA"/>
           </a:p>
@@ -3881,7 +3881,7 @@
           <a:p>
             <a:r>
               <a:rPr lang="en-CA" dirty="0"/>
-              <a:t>scripts/biology.py</a:t>
+              <a:t>scripts/biology</a:t>
             </a:r>
           </a:p>
           <a:p>
@@ -4531,8 +4531,8 @@
         </p:nvSpPr>
         <p:spPr>
           <a:xfrm>
-            <a:off x="27272457" y="10211717"/>
-            <a:ext cx="8542421" cy="10064294"/>
+            <a:off x="27073981" y="7699722"/>
+            <a:ext cx="8542421" cy="12003286"/>
           </a:xfrm>
           <a:prstGeom prst="rect">
             <a:avLst/>
@@ -4564,13 +4564,42 @@
             </a:r>
           </a:p>
           <a:p>
-            <a:endParaRPr lang="en-CA" dirty="0"/>
-          </a:p>
-          <a:p>
-            <a:r>
-              <a:rPr lang="en-CA" dirty="0"/>
-              <a:t>mapping/presentation_maps_20210406</a:t>
-            </a:r>
+            <a:r>
+              <a:rPr lang="en-CA" b="1" dirty="0"/>
+              <a:t>(greyed text for maps/plots that were exploratory and not intended for the manuscript)</a:t>
+            </a:r>
+          </a:p>
+          <a:p>
+            <a:endParaRPr lang="en-CA" dirty="0"/>
+          </a:p>
+          <a:p>
+            <a:r>
+              <a:rPr lang="en-CA" dirty="0">
+                <a:solidFill>
+                  <a:schemeClr val="bg1">
+                    <a:lumMod val="65000"/>
+                  </a:schemeClr>
+                </a:solidFill>
+              </a:rPr>
+              <a:t>mapping/</a:t>
+            </a:r>
+            <a:r>
+              <a:rPr lang="en-CA" dirty="0" err="1">
+                <a:solidFill>
+                  <a:schemeClr val="bg1">
+                    <a:lumMod val="65000"/>
+                  </a:schemeClr>
+                </a:solidFill>
+              </a:rPr>
+              <a:t>mapping_scratch</a:t>
+            </a:r>
+            <a:endParaRPr lang="en-CA" dirty="0">
+              <a:solidFill>
+                <a:schemeClr val="bg1">
+                  <a:lumMod val="65000"/>
+                </a:schemeClr>
+              </a:solidFill>
+            </a:endParaRPr>
           </a:p>
           <a:p>
             <a:pPr marL="285750" indent="-285750">
@@ -4578,8 +4607,24 @@
               <a:buChar char="•"/>
             </a:pPr>
             <a:r>
-              <a:rPr lang="en-CA" dirty="0"/>
-              <a:t>Hydro model outline</a:t>
+              <a:rPr lang="en-CA" dirty="0" err="1">
+                <a:solidFill>
+                  <a:schemeClr val="bg1">
+                    <a:lumMod val="65000"/>
+                  </a:schemeClr>
+                </a:solidFill>
+              </a:rPr>
+              <a:t>Mpas</a:t>
+            </a:r>
+            <a:r>
+              <a:rPr lang="en-CA" dirty="0">
+                <a:solidFill>
+                  <a:schemeClr val="bg1">
+                    <a:lumMod val="65000"/>
+                  </a:schemeClr>
+                </a:solidFill>
+              </a:rPr>
+              <a:t> excluded map</a:t>
             </a:r>
           </a:p>
           <a:p>
@@ -4587,10 +4632,42 @@
               <a:buFont typeface="Arial" panose="020B0604020202020204" pitchFamily="34" charset="0"/>
               <a:buChar char="•"/>
             </a:pPr>
-            <a:r>
-              <a:rPr lang="en-CA" dirty="0"/>
-              <a:t>Hydro model zoom</a:t>
-            </a:r>
+            <a:endParaRPr lang="en-CA" dirty="0">
+              <a:solidFill>
+                <a:schemeClr val="bg1">
+                  <a:lumMod val="65000"/>
+                </a:schemeClr>
+              </a:solidFill>
+            </a:endParaRPr>
+          </a:p>
+          <a:p>
+            <a:r>
+              <a:rPr lang="en-CA" dirty="0">
+                <a:solidFill>
+                  <a:schemeClr val="bg1">
+                    <a:lumMod val="65000"/>
+                  </a:schemeClr>
+                </a:solidFill>
+              </a:rPr>
+              <a:t>scripts/</a:t>
+            </a:r>
+            <a:r>
+              <a:rPr lang="en-CA" dirty="0" err="1">
+                <a:solidFill>
+                  <a:schemeClr val="bg1">
+                    <a:lumMod val="65000"/>
+                  </a:schemeClr>
+                </a:solidFill>
+              </a:rPr>
+              <a:t>pld</a:t>
+            </a:r>
+            <a:endParaRPr lang="en-CA" dirty="0">
+              <a:solidFill>
+                <a:schemeClr val="bg1">
+                  <a:lumMod val="65000"/>
+                </a:schemeClr>
+              </a:solidFill>
+            </a:endParaRPr>
           </a:p>
           <a:p>
             <a:pPr marL="285750" indent="-285750">
@@ -4598,9 +4675,67 @@
               <a:buChar char="•"/>
             </a:pPr>
             <a:r>
-              <a:rPr lang="en-CA" dirty="0"/>
-              <a:t>Mpa original and modified</a:t>
-            </a:r>
+              <a:rPr lang="en-CA" dirty="0">
+                <a:solidFill>
+                  <a:schemeClr val="bg1">
+                    <a:lumMod val="65000"/>
+                  </a:schemeClr>
+                </a:solidFill>
+              </a:rPr>
+              <a:t>PLD bar graph</a:t>
+            </a:r>
+          </a:p>
+          <a:p>
+            <a:endParaRPr lang="en-CA" dirty="0"/>
+          </a:p>
+          <a:p>
+            <a:r>
+              <a:rPr lang="en-CA" dirty="0">
+                <a:solidFill>
+                  <a:schemeClr val="bg1">
+                    <a:lumMod val="65000"/>
+                  </a:schemeClr>
+                </a:solidFill>
+              </a:rPr>
+              <a:t>scripts/</a:t>
+            </a:r>
+            <a:r>
+              <a:rPr lang="en-CA" dirty="0" err="1">
+                <a:solidFill>
+                  <a:schemeClr val="bg1">
+                    <a:lumMod val="65000"/>
+                  </a:schemeClr>
+                </a:solidFill>
+              </a:rPr>
+              <a:t>particle_count</a:t>
+            </a:r>
+            <a:r>
+              <a:rPr lang="en-CA" dirty="0">
+                <a:solidFill>
+                  <a:schemeClr val="bg1">
+                    <a:lumMod val="65000"/>
+                  </a:schemeClr>
+                </a:solidFill>
+              </a:rPr>
+              <a:t>/analysis/</a:t>
+            </a:r>
+            <a:r>
+              <a:rPr lang="en-CA" dirty="0" err="1">
+                <a:solidFill>
+                  <a:schemeClr val="bg1">
+                    <a:lumMod val="65000"/>
+                  </a:schemeClr>
+                </a:solidFill>
+              </a:rPr>
+              <a:t>band_statistics</a:t>
+            </a:r>
+            <a:endParaRPr lang="en-CA" dirty="0">
+              <a:solidFill>
+                <a:schemeClr val="bg1">
+                  <a:lumMod val="65000"/>
+                </a:schemeClr>
+              </a:solidFill>
+            </a:endParaRPr>
           </a:p>
           <a:p>
             <a:pPr marL="285750" indent="-285750">
@@ -4608,8 +4743,14 @@
               <a:buChar char="•"/>
             </a:pPr>
             <a:r>
-              <a:rPr lang="en-CA" dirty="0"/>
-              <a:t>Mpa zoom original and modified</a:t>
+              <a:rPr lang="en-CA" dirty="0">
+                <a:solidFill>
+                  <a:schemeClr val="bg1">
+                    <a:lumMod val="65000"/>
+                  </a:schemeClr>
+                </a:solidFill>
+              </a:rPr>
+              <a:t>Plots of Fraction of Unexplained Variance vs. Percentage of Particles Released</a:t>
             </a:r>
           </a:p>
           <a:p>
@@ -4617,18 +4758,42 @@
               <a:buFont typeface="Arial" panose="020B0604020202020204" pitchFamily="34" charset="0"/>
               <a:buChar char="•"/>
             </a:pPr>
-            <a:r>
-              <a:rPr lang="en-CA" dirty="0"/>
-              <a:t>Particles </a:t>
-            </a:r>
-            <a:r>
-              <a:rPr lang="en-CA" dirty="0" err="1"/>
-              <a:t>pld</a:t>
-            </a:r>
-            <a:r>
-              <a:rPr lang="en-CA" dirty="0"/>
-              <a:t> 1 vs 60, with and without mortality</a:t>
-            </a:r>
+            <a:endParaRPr lang="en-CA" dirty="0">
+              <a:solidFill>
+                <a:schemeClr val="bg1">
+                  <a:lumMod val="65000"/>
+                </a:schemeClr>
+              </a:solidFill>
+            </a:endParaRPr>
+          </a:p>
+          <a:p>
+            <a:r>
+              <a:rPr lang="en-CA" dirty="0">
+                <a:solidFill>
+                  <a:schemeClr val="bg1">
+                    <a:lumMod val="65000"/>
+                  </a:schemeClr>
+                </a:solidFill>
+              </a:rPr>
+              <a:t>scripts/</a:t>
+            </a:r>
+            <a:r>
+              <a:rPr lang="en-CA" dirty="0" err="1">
+                <a:solidFill>
+                  <a:schemeClr val="bg1">
+                    <a:lumMod val="65000"/>
+                  </a:schemeClr>
+                </a:solidFill>
+              </a:rPr>
+              <a:t>distance_analysis</a:t>
+            </a:r>
+            <a:endParaRPr lang="en-CA" dirty="0">
+              <a:solidFill>
+                <a:schemeClr val="bg1">
+                  <a:lumMod val="65000"/>
+                </a:schemeClr>
+              </a:solidFill>
+            </a:endParaRPr>
           </a:p>
           <a:p>
             <a:pPr marL="285750" indent="-285750">
@@ -4636,8 +4801,14 @@
               <a:buChar char="•"/>
             </a:pPr>
             <a:r>
-              <a:rPr lang="en-CA" dirty="0"/>
-              <a:t>Connection lines by PLD</a:t>
+              <a:rPr lang="en-CA" dirty="0">
+                <a:solidFill>
+                  <a:schemeClr val="bg1">
+                    <a:lumMod val="65000"/>
+                  </a:schemeClr>
+                </a:solidFill>
+              </a:rPr>
+              <a:t>Connection probability vs distance</a:t>
             </a:r>
           </a:p>
           <a:p>
@@ -4646,8 +4817,14 @@
               <a:buChar char="•"/>
             </a:pPr>
             <a:r>
-              <a:rPr lang="en-CA" dirty="0"/>
-              <a:t>Betweenness Centrality</a:t>
+              <a:rPr lang="en-CA" dirty="0">
+                <a:solidFill>
+                  <a:schemeClr val="bg1">
+                    <a:lumMod val="65000"/>
+                  </a:schemeClr>
+                </a:solidFill>
+              </a:rPr>
+              <a:t>Connection probability vs distance (by PLD)</a:t>
             </a:r>
           </a:p>
           <a:p>
@@ -4656,9 +4833,67 @@
               <a:buChar char="•"/>
             </a:pPr>
             <a:r>
-              <a:rPr lang="en-CA" dirty="0"/>
-              <a:t>Particles recruited to coastline</a:t>
-            </a:r>
+              <a:rPr lang="en-CA" dirty="0">
+                <a:solidFill>
+                  <a:schemeClr val="bg1">
+                    <a:lumMod val="65000"/>
+                  </a:schemeClr>
+                </a:solidFill>
+              </a:rPr>
+              <a:t>% conns established within 20km vs. conn threshold, by PLD</a:t>
+            </a:r>
+          </a:p>
+          <a:p>
+            <a:endParaRPr lang="en-CA" dirty="0"/>
+          </a:p>
+          <a:p>
+            <a:r>
+              <a:rPr lang="en-CA" dirty="0">
+                <a:solidFill>
+                  <a:schemeClr val="bg1">
+                    <a:lumMod val="65000"/>
+                  </a:schemeClr>
+                </a:solidFill>
+              </a:rPr>
+              <a:t>scripts/</a:t>
+            </a:r>
+            <a:r>
+              <a:rPr lang="en-CA" dirty="0" err="1">
+                <a:solidFill>
+                  <a:schemeClr val="bg1">
+                    <a:lumMod val="65000"/>
+                  </a:schemeClr>
+                </a:solidFill>
+              </a:rPr>
+              <a:t>distance_analysis</a:t>
+            </a:r>
+            <a:r>
+              <a:rPr lang="en-CA" dirty="0">
+                <a:solidFill>
+                  <a:schemeClr val="bg1">
+                    <a:lumMod val="65000"/>
+                  </a:schemeClr>
+                </a:solidFill>
+              </a:rPr>
+              <a:t>/</a:t>
+            </a:r>
+            <a:r>
+              <a:rPr lang="en-CA" dirty="0" err="1">
+                <a:solidFill>
+                  <a:schemeClr val="bg1">
+                    <a:lumMod val="65000"/>
+                  </a:schemeClr>
+                </a:solidFill>
+              </a:rPr>
+              <a:t>conns_established_mapping</a:t>
+            </a:r>
+            <a:endParaRPr lang="en-CA" dirty="0">
+              <a:solidFill>
+                <a:schemeClr val="bg1">
+                  <a:lumMod val="65000"/>
+                </a:schemeClr>
+              </a:solidFill>
+            </a:endParaRPr>
           </a:p>
           <a:p>
             <a:pPr marL="285750" indent="-285750">
@@ -4666,23 +4901,67 @@
               <a:buChar char="•"/>
             </a:pPr>
             <a:r>
-              <a:rPr lang="en-CA" dirty="0"/>
-              <a:t>Raster of particle count recruited to coastline</a:t>
-            </a:r>
-          </a:p>
-          <a:p>
-            <a:endParaRPr lang="en-CA" dirty="0"/>
-          </a:p>
-          <a:p>
-            <a:r>
-              <a:rPr lang="en-CA" dirty="0"/>
-              <a:t>mapping/</a:t>
-            </a:r>
-            <a:r>
-              <a:rPr lang="en-CA" dirty="0" err="1"/>
-              <a:t>mapping_scratch</a:t>
-            </a:r>
-            <a:endParaRPr lang="en-CA" dirty="0"/>
+              <a:rPr lang="en-CA" dirty="0">
+                <a:solidFill>
+                  <a:schemeClr val="bg1">
+                    <a:lumMod val="65000"/>
+                  </a:schemeClr>
+                </a:solidFill>
+              </a:rPr>
+              <a:t>Highlight connections not established in red</a:t>
+            </a:r>
+          </a:p>
+          <a:p>
+            <a:endParaRPr lang="en-CA" dirty="0"/>
+          </a:p>
+          <a:p>
+            <a:r>
+              <a:rPr lang="en-CA" dirty="0">
+                <a:solidFill>
+                  <a:schemeClr val="bg1">
+                    <a:lumMod val="65000"/>
+                  </a:schemeClr>
+                </a:solidFill>
+              </a:rPr>
+              <a:t>scripts/</a:t>
+            </a:r>
+            <a:r>
+              <a:rPr lang="en-CA" dirty="0" err="1">
+                <a:solidFill>
+                  <a:schemeClr val="bg1">
+                    <a:lumMod val="65000"/>
+                  </a:schemeClr>
+                </a:solidFill>
+              </a:rPr>
+              <a:t>distance_analysis</a:t>
+            </a:r>
+            <a:r>
+              <a:rPr lang="en-CA" dirty="0">
+                <a:solidFill>
+                  <a:schemeClr val="bg1">
+                    <a:lumMod val="65000"/>
+                  </a:schemeClr>
+                </a:solidFill>
+              </a:rPr>
+              <a:t>/</a:t>
+            </a:r>
+            <a:r>
+              <a:rPr lang="en-CA" dirty="0" err="1">
+                <a:solidFill>
+                  <a:schemeClr val="bg1">
+                    <a:lumMod val="65000"/>
+                  </a:schemeClr>
+                </a:solidFill>
+              </a:rPr>
+              <a:t>components_mapping</a:t>
+            </a:r>
+            <a:endParaRPr lang="en-CA" dirty="0">
+              <a:solidFill>
+                <a:schemeClr val="bg1">
+                  <a:lumMod val="65000"/>
+                </a:schemeClr>
+              </a:solidFill>
+            </a:endParaRPr>
           </a:p>
           <a:p>
             <a:pPr marL="285750" indent="-285750">
@@ -4690,12 +4969,14 @@
               <a:buChar char="•"/>
             </a:pPr>
             <a:r>
-              <a:rPr lang="en-CA" dirty="0" err="1"/>
-              <a:t>Mpas</a:t>
-            </a:r>
-            <a:r>
-              <a:rPr lang="en-CA" dirty="0"/>
-              <a:t> excluded map</a:t>
+              <a:rPr lang="en-CA" dirty="0">
+                <a:solidFill>
+                  <a:schemeClr val="bg1">
+                    <a:lumMod val="65000"/>
+                  </a:schemeClr>
+                </a:solidFill>
+              </a:rPr>
+              <a:t>Strongly connected graph components highlighted overtop of all connections at each threshold (for a certain PLD)</a:t>
             </a:r>
           </a:p>
           <a:p>
@@ -4708,13 +4989,8 @@
           <a:p>
             <a:r>
               <a:rPr lang="en-CA" dirty="0"/>
-              <a:t>scripts/</a:t>
-            </a:r>
-            <a:r>
-              <a:rPr lang="en-CA" dirty="0" err="1"/>
-              <a:t>pld</a:t>
-            </a:r>
-            <a:endParaRPr lang="en-CA" dirty="0"/>
+              <a:t>Mapping/publication_figures_chap2</a:t>
+            </a:r>
           </a:p>
           <a:p>
             <a:pPr marL="285750" indent="-285750">
@@ -4723,30 +4999,8 @@
             </a:pPr>
             <a:r>
               <a:rPr lang="en-CA" dirty="0"/>
-              <a:t>PLD bar graph</a:t>
-            </a:r>
-          </a:p>
-          <a:p>
-            <a:endParaRPr lang="en-CA" dirty="0"/>
-          </a:p>
-          <a:p>
-            <a:r>
-              <a:rPr lang="en-CA" dirty="0"/>
-              <a:t>scripts/</a:t>
-            </a:r>
-            <a:r>
-              <a:rPr lang="en-CA" dirty="0" err="1"/>
-              <a:t>particle_count</a:t>
-            </a:r>
-            <a:r>
-              <a:rPr lang="en-CA" dirty="0"/>
-              <a:t>/analysis/</a:t>
-            </a:r>
-            <a:r>
-              <a:rPr lang="en-CA" dirty="0" err="1"/>
-              <a:t>band_statistics</a:t>
-            </a:r>
-            <a:endParaRPr lang="en-CA" dirty="0"/>
+              <a:t>Study area</a:t>
+            </a:r>
           </a:p>
           <a:p>
             <a:pPr marL="285750" indent="-285750">
@@ -4755,7 +5009,7 @@
             </a:pPr>
             <a:r>
               <a:rPr lang="en-CA" dirty="0"/>
-              <a:t>Plots of Fraction of Unexplained Variance vs. Percentage of Particles Released</a:t>
+              <a:t>Connections by PLD</a:t>
             </a:r>
           </a:p>
           <a:p>
@@ -4763,18 +5017,18 @@
               <a:buFont typeface="Arial" panose="020B0604020202020204" pitchFamily="34" charset="0"/>
               <a:buChar char="•"/>
             </a:pPr>
-            <a:endParaRPr lang="en-CA" dirty="0"/>
-          </a:p>
-          <a:p>
-            <a:r>
-              <a:rPr lang="en-CA" dirty="0"/>
-              <a:t>scripts/</a:t>
+            <a:r>
+              <a:rPr lang="en-CA" dirty="0"/>
+              <a:t>Components from </a:t>
             </a:r>
             <a:r>
               <a:rPr lang="en-CA" dirty="0" err="1"/>
-              <a:t>distance_analysis</a:t>
-            </a:r>
-            <a:endParaRPr lang="en-CA" dirty="0"/>
+              <a:t>metapop</a:t>
+            </a:r>
+            <a:r>
+              <a:rPr lang="en-CA" dirty="0"/>
+              <a:t> model map</a:t>
+            </a:r>
           </a:p>
           <a:p>
             <a:pPr marL="285750" indent="-285750">
@@ -4782,8 +5036,12 @@
               <a:buChar char="•"/>
             </a:pPr>
             <a:r>
-              <a:rPr lang="en-CA" dirty="0"/>
-              <a:t>Connection probability vs distance</a:t>
+              <a:rPr lang="en-CA" dirty="0" err="1"/>
+              <a:t>Rasters</a:t>
+            </a:r>
+            <a:r>
+              <a:rPr lang="en-CA" dirty="0"/>
+              <a:t> of settlement on unprotected area of coast</a:t>
             </a:r>
           </a:p>
           <a:p>
@@ -4793,7 +5051,7 @@
             </a:pPr>
             <a:r>
               <a:rPr lang="en-CA" dirty="0"/>
-              <a:t>Connection probability vs distance (by PLD)</a:t>
+              <a:t>GLMM maps (3)</a:t>
             </a:r>
           </a:p>
           <a:p>
@@ -4803,62 +5061,21 @@
             </a:pPr>
             <a:r>
               <a:rPr lang="en-CA" dirty="0"/>
-              <a:t>% conns established within 20km vs. conn threshold, by PLD</a:t>
-            </a:r>
-          </a:p>
-          <a:p>
-            <a:endParaRPr lang="en-CA" dirty="0"/>
-          </a:p>
-          <a:p>
-            <a:r>
-              <a:rPr lang="en-CA" dirty="0"/>
-              <a:t>scripts/</a:t>
-            </a:r>
-            <a:r>
-              <a:rPr lang="en-CA" dirty="0" err="1"/>
-              <a:t>distance_analysis</a:t>
-            </a:r>
-            <a:r>
-              <a:rPr lang="en-CA" dirty="0"/>
-              <a:t>/</a:t>
-            </a:r>
-            <a:r>
-              <a:rPr lang="en-CA" dirty="0" err="1"/>
-              <a:t>conns_established_mapping</a:t>
-            </a:r>
-            <a:endParaRPr lang="en-CA" dirty="0"/>
+              <a:t>Supplement maps (distance map, fetch) (NOTE YET FINISHED)</a:t>
+            </a:r>
           </a:p>
           <a:p>
             <a:pPr marL="285750" indent="-285750">
               <a:buFont typeface="Arial" panose="020B0604020202020204" pitchFamily="34" charset="0"/>
               <a:buChar char="•"/>
             </a:pPr>
-            <a:r>
-              <a:rPr lang="en-CA" dirty="0"/>
-              <a:t>Highlight connections not established in red</a:t>
-            </a:r>
-          </a:p>
-          <a:p>
-            <a:endParaRPr lang="en-CA" dirty="0"/>
-          </a:p>
-          <a:p>
-            <a:r>
-              <a:rPr lang="en-CA" dirty="0"/>
-              <a:t>scripts/</a:t>
-            </a:r>
-            <a:r>
-              <a:rPr lang="en-CA" dirty="0" err="1"/>
-              <a:t>distance_analysis</a:t>
-            </a:r>
-            <a:r>
-              <a:rPr lang="en-CA" dirty="0"/>
-              <a:t>/</a:t>
-            </a:r>
-            <a:r>
-              <a:rPr lang="en-CA" dirty="0" err="1"/>
-              <a:t>components_mapping</a:t>
-            </a:r>
-            <a:endParaRPr lang="en-CA" dirty="0"/>
+            <a:endParaRPr lang="en-CA" dirty="0"/>
+          </a:p>
+          <a:p>
+            <a:r>
+              <a:rPr lang="en-CA" dirty="0"/>
+              <a:t>Scripts/analysis_results/05_recruit_rasters_plot.py</a:t>
+            </a:r>
           </a:p>
           <a:p>
             <a:pPr marL="285750" indent="-285750">
@@ -4867,14 +5084,135 @@
             </a:pPr>
             <a:r>
               <a:rPr lang="en-CA" dirty="0"/>
-              <a:t>Strongly connected graph components highlighted overtop of all connections at each threshold (for a certain PLD)</a:t>
-            </a:r>
-          </a:p>
-          <a:p>
-            <a:endParaRPr lang="en-CA" dirty="0"/>
-          </a:p>
-          <a:p>
-            <a:endParaRPr lang="en-CA" dirty="0"/>
+              <a:t>Plots of % coastline receiving recruits and the % of recruits that settle</a:t>
+            </a:r>
+          </a:p>
+          <a:p>
+            <a:pPr marL="285750" indent="-285750">
+              <a:buFont typeface="Arial" panose="020B0604020202020204" pitchFamily="34" charset="0"/>
+              <a:buChar char="•"/>
+            </a:pPr>
+            <a:endParaRPr lang="en-CA" dirty="0"/>
+          </a:p>
+          <a:p>
+            <a:r>
+              <a:rPr lang="en-CA" dirty="0"/>
+              <a:t>Scripts/</a:t>
+            </a:r>
+            <a:r>
+              <a:rPr lang="en-CA" dirty="0" err="1"/>
+              <a:t>metapop_pers</a:t>
+            </a:r>
+            <a:r>
+              <a:rPr lang="en-CA" dirty="0"/>
+              <a:t>/figs</a:t>
+            </a:r>
+          </a:p>
+          <a:p>
+            <a:pPr marL="285750" indent="-285750">
+              <a:buFont typeface="Arial" panose="020B0604020202020204" pitchFamily="34" charset="0"/>
+              <a:buChar char="•"/>
+            </a:pPr>
+            <a:r>
+              <a:rPr lang="en-CA" dirty="0"/>
+              <a:t>% of </a:t>
+            </a:r>
+            <a:r>
+              <a:rPr lang="en-CA" dirty="0" err="1"/>
+              <a:t>mpas</a:t>
+            </a:r>
+            <a:r>
+              <a:rPr lang="en-CA" dirty="0"/>
+              <a:t> persistent by dispersal rate</a:t>
+            </a:r>
+          </a:p>
+          <a:p>
+            <a:pPr marL="285750" indent="-285750">
+              <a:buFont typeface="Arial" panose="020B0604020202020204" pitchFamily="34" charset="0"/>
+              <a:buChar char="•"/>
+            </a:pPr>
+            <a:r>
+              <a:rPr lang="en-CA" dirty="0">
+                <a:solidFill>
+                  <a:schemeClr val="bg1">
+                    <a:lumMod val="65000"/>
+                  </a:schemeClr>
+                </a:solidFill>
+              </a:rPr>
+              <a:t>Correlation and proportion persistent plots</a:t>
+            </a:r>
+          </a:p>
+          <a:p>
+            <a:pPr marL="285750" indent="-285750">
+              <a:buFont typeface="Arial" panose="020B0604020202020204" pitchFamily="34" charset="0"/>
+              <a:buChar char="•"/>
+            </a:pPr>
+            <a:endParaRPr lang="en-CA" dirty="0">
+              <a:solidFill>
+                <a:schemeClr val="bg1">
+                  <a:lumMod val="65000"/>
+                </a:schemeClr>
+              </a:solidFill>
+            </a:endParaRPr>
+          </a:p>
+          <a:p>
+            <a:r>
+              <a:rPr lang="en-CA" dirty="0">
+                <a:solidFill>
+                  <a:schemeClr val="tx1"/>
+                </a:solidFill>
+              </a:rPr>
+              <a:t>Scripts/</a:t>
+            </a:r>
+            <a:r>
+              <a:rPr lang="en-CA" dirty="0" err="1">
+                <a:solidFill>
+                  <a:schemeClr val="tx1"/>
+                </a:solidFill>
+              </a:rPr>
+              <a:t>particle_model</a:t>
+            </a:r>
+            <a:endParaRPr lang="en-CA" dirty="0">
+              <a:solidFill>
+                <a:schemeClr val="tx1"/>
+              </a:solidFill>
+            </a:endParaRPr>
+          </a:p>
+          <a:p>
+            <a:pPr marL="285750" indent="-285750">
+              <a:buFont typeface="Arial" panose="020B0604020202020204" pitchFamily="34" charset="0"/>
+              <a:buChar char="•"/>
+            </a:pPr>
+            <a:r>
+              <a:rPr lang="en-CA" dirty="0" err="1">
+                <a:solidFill>
+                  <a:schemeClr val="tx1"/>
+                </a:solidFill>
+              </a:rPr>
+              <a:t>Dipsersal</a:t>
+            </a:r>
+            <a:r>
+              <a:rPr lang="en-CA" dirty="0">
+                <a:solidFill>
+                  <a:schemeClr val="tx1"/>
+                </a:solidFill>
+              </a:rPr>
+              <a:t> distance vs. exposure</a:t>
+            </a:r>
+          </a:p>
+          <a:p>
+            <a:pPr marL="285750" indent="-285750">
+              <a:buFont typeface="Arial" panose="020B0604020202020204" pitchFamily="34" charset="0"/>
+              <a:buChar char="•"/>
+            </a:pPr>
+            <a:r>
+              <a:rPr lang="en-CA" dirty="0">
+                <a:solidFill>
+                  <a:schemeClr val="tx1"/>
+                </a:solidFill>
+              </a:rPr>
+              <a:t>Predicted vs observed (NOT YET FINISHED)</a:t>
+            </a:r>
           </a:p>
           <a:p>
             <a:endParaRPr lang="en-CA" dirty="0"/>

</xml_diff>